<commit_message>
Abstract updated, cover letter created
</commit_message>
<xml_diff>
--- a/modes.pptx
+++ b/modes.pptx
@@ -302,7 +302,7 @@
             <a:fld id="{BC01DBB0-6DC4-46D1-8E31-51F8666F41FC}" type="datetime1">
               <a:rPr lang="en-US"/>
               <a:pPr/>
-              <a:t>10/8/18</a:t>
+              <a:t>11/23/18</a:t>
             </a:fld>
             <a:endParaRPr lang="en-US"/>
           </a:p>
@@ -524,7 +524,7 @@
             <a:fld id="{59A5AA97-B231-4D5F-B418-FD879D29C574}" type="datetime1">
               <a:rPr lang="en-US"/>
               <a:pPr/>
-              <a:t>10/8/18</a:t>
+              <a:t>11/23/18</a:t>
             </a:fld>
             <a:endParaRPr lang="en-US"/>
           </a:p>
@@ -927,7 +927,7 @@
             <a:fld id="{59A5AA97-B231-4D5F-B418-FD879D29C574}" type="datetime1">
               <a:rPr lang="en-US" smtClean="0"/>
               <a:pPr/>
-              <a:t>10/8/18</a:t>
+              <a:t>11/23/18</a:t>
             </a:fld>
             <a:endParaRPr lang="en-US"/>
           </a:p>
@@ -1281,7 +1281,7 @@
             <a:fld id="{2086C027-54B9-40D6-8644-F0649E27BEE5}" type="datetime3">
               <a:rPr lang="en-US" smtClean="0"/>
               <a:pPr/>
-              <a:t>8 October 2018</a:t>
+              <a:t>23 November 2018</a:t>
             </a:fld>
             <a:endParaRPr lang="en-US"/>
           </a:p>
@@ -1547,7 +1547,7 @@
             <a:fld id="{C4399F37-CA9F-4AF4-9312-699B48FDDDEA}" type="datetime3">
               <a:rPr lang="en-US" smtClean="0"/>
               <a:pPr/>
-              <a:t>8 October 2018</a:t>
+              <a:t>23 November 2018</a:t>
             </a:fld>
             <a:endParaRPr lang="en-US"/>
           </a:p>
@@ -1826,7 +1826,7 @@
             <a:fld id="{AAD7FDC1-2212-4426-BBAC-A50511A7AA99}" type="datetime3">
               <a:rPr lang="en-US" smtClean="0"/>
               <a:pPr/>
-              <a:t>8 October 2018</a:t>
+              <a:t>23 November 2018</a:t>
             </a:fld>
             <a:endParaRPr lang="en-US"/>
           </a:p>
@@ -1944,7 +1944,7 @@
             <a:fld id="{FBDBA605-A968-4017-AEAF-5876781A0080}" type="datetime3">
               <a:rPr lang="en-US" smtClean="0"/>
               <a:pPr/>
-              <a:t>8 October 2018</a:t>
+              <a:t>23 November 2018</a:t>
             </a:fld>
             <a:endParaRPr lang="en-US"/>
           </a:p>
@@ -2077,7 +2077,7 @@
             <a:fld id="{F70D1C53-6B93-4AF1-991E-AC59592DF2EF}" type="datetime3">
               <a:rPr lang="en-US" smtClean="0"/>
               <a:pPr/>
-              <a:t>8 October 2018</a:t>
+              <a:t>23 November 2018</a:t>
             </a:fld>
             <a:endParaRPr lang="en-US"/>
           </a:p>
@@ -2385,7 +2385,7 @@
             <a:fld id="{9EABEE3C-CDA0-42A2-8EEF-BE5C0E14E1D6}" type="datetime3">
               <a:rPr lang="en-US" smtClean="0"/>
               <a:pPr/>
-              <a:t>8 October 2018</a:t>
+              <a:t>23 November 2018</a:t>
             </a:fld>
             <a:endParaRPr lang="en-US"/>
           </a:p>
@@ -3274,7 +3274,10 @@
           <a:lstStyle/>
           <a:p>
             <a:pPr algn="ctr"/>
-            <a:endParaRPr lang="en-US"/>
+            <a:endParaRPr lang="en-US">
+              <a:latin typeface="Times New Roman" panose="02020603050405020304" pitchFamily="18" charset="0"/>
+              <a:cs typeface="Times New Roman" panose="02020603050405020304" pitchFamily="18" charset="0"/>
+            </a:endParaRPr>
           </a:p>
         </p:txBody>
       </p:sp>
@@ -3322,7 +3325,10 @@
           <a:lstStyle/>
           <a:p>
             <a:pPr algn="ctr"/>
-            <a:endParaRPr lang="en-US"/>
+            <a:endParaRPr lang="en-US">
+              <a:latin typeface="Times New Roman" panose="02020603050405020304" pitchFamily="18" charset="0"/>
+              <a:cs typeface="Times New Roman" panose="02020603050405020304" pitchFamily="18" charset="0"/>
+            </a:endParaRPr>
           </a:p>
         </p:txBody>
       </p:sp>
@@ -3497,6 +3503,8 @@
                     <a:lumMod val="50000"/>
                   </a:schemeClr>
                 </a:solidFill>
+                <a:latin typeface="Times New Roman" panose="02020603050405020304" pitchFamily="18" charset="0"/>
+                <a:cs typeface="Times New Roman" panose="02020603050405020304" pitchFamily="18" charset="0"/>
               </a:rPr>
               <a:t>|AO</a:t>
             </a:r>
@@ -3507,6 +3515,8 @@
                     <a:lumMod val="50000"/>
                   </a:schemeClr>
                 </a:solidFill>
+                <a:latin typeface="Times New Roman" panose="02020603050405020304" pitchFamily="18" charset="0"/>
+                <a:cs typeface="Times New Roman" panose="02020603050405020304" pitchFamily="18" charset="0"/>
               </a:rPr>
               <a:t>1</a:t>
             </a:r>
@@ -3517,6 +3527,8 @@
                     <a:lumMod val="50000"/>
                   </a:schemeClr>
                 </a:solidFill>
+                <a:latin typeface="Times New Roman" panose="02020603050405020304" pitchFamily="18" charset="0"/>
+                <a:cs typeface="Times New Roman" panose="02020603050405020304" pitchFamily="18" charset="0"/>
               </a:rPr>
               <a:t>⟩</a:t>
             </a:r>
@@ -3526,6 +3538,8 @@
                   <a:lumMod val="50000"/>
                 </a:schemeClr>
               </a:solidFill>
+              <a:latin typeface="Times New Roman" panose="02020603050405020304" pitchFamily="18" charset="0"/>
+              <a:cs typeface="Times New Roman" panose="02020603050405020304" pitchFamily="18" charset="0"/>
             </a:endParaRPr>
           </a:p>
         </p:txBody>
@@ -3581,6 +3595,8 @@
                     <a:lumMod val="50000"/>
                   </a:schemeClr>
                 </a:solidFill>
+                <a:latin typeface="Times New Roman" panose="02020603050405020304" pitchFamily="18" charset="0"/>
+                <a:cs typeface="Times New Roman" panose="02020603050405020304" pitchFamily="18" charset="0"/>
               </a:rPr>
               <a:t>|AO</a:t>
             </a:r>
@@ -3591,6 +3607,8 @@
                     <a:lumMod val="50000"/>
                   </a:schemeClr>
                 </a:solidFill>
+                <a:latin typeface="Times New Roman" panose="02020603050405020304" pitchFamily="18" charset="0"/>
+                <a:cs typeface="Times New Roman" panose="02020603050405020304" pitchFamily="18" charset="0"/>
               </a:rPr>
               <a:t>2</a:t>
             </a:r>
@@ -3601,6 +3619,8 @@
                     <a:lumMod val="50000"/>
                   </a:schemeClr>
                 </a:solidFill>
+                <a:latin typeface="Times New Roman" panose="02020603050405020304" pitchFamily="18" charset="0"/>
+                <a:cs typeface="Times New Roman" panose="02020603050405020304" pitchFamily="18" charset="0"/>
               </a:rPr>
               <a:t>⟩</a:t>
             </a:r>
@@ -3610,6 +3630,8 @@
                   <a:lumMod val="50000"/>
                 </a:schemeClr>
               </a:solidFill>
+              <a:latin typeface="Times New Roman" panose="02020603050405020304" pitchFamily="18" charset="0"/>
+              <a:cs typeface="Times New Roman" panose="02020603050405020304" pitchFamily="18" charset="0"/>
             </a:endParaRPr>
           </a:p>
         </p:txBody>
@@ -3665,6 +3687,8 @@
                     <a:lumMod val="50000"/>
                   </a:schemeClr>
                 </a:solidFill>
+                <a:latin typeface="Times New Roman" panose="02020603050405020304" pitchFamily="18" charset="0"/>
+                <a:cs typeface="Times New Roman" panose="02020603050405020304" pitchFamily="18" charset="0"/>
               </a:rPr>
               <a:t>|AO</a:t>
             </a:r>
@@ -3675,6 +3699,8 @@
                     <a:lumMod val="50000"/>
                   </a:schemeClr>
                 </a:solidFill>
+                <a:latin typeface="Times New Roman" panose="02020603050405020304" pitchFamily="18" charset="0"/>
+                <a:cs typeface="Times New Roman" panose="02020603050405020304" pitchFamily="18" charset="0"/>
               </a:rPr>
               <a:t>3</a:t>
             </a:r>
@@ -3685,6 +3711,8 @@
                     <a:lumMod val="50000"/>
                   </a:schemeClr>
                 </a:solidFill>
+                <a:latin typeface="Times New Roman" panose="02020603050405020304" pitchFamily="18" charset="0"/>
+                <a:cs typeface="Times New Roman" panose="02020603050405020304" pitchFamily="18" charset="0"/>
               </a:rPr>
               <a:t>⟩</a:t>
             </a:r>
@@ -3694,6 +3722,8 @@
                   <a:lumMod val="50000"/>
                 </a:schemeClr>
               </a:solidFill>
+              <a:latin typeface="Times New Roman" panose="02020603050405020304" pitchFamily="18" charset="0"/>
+              <a:cs typeface="Times New Roman" panose="02020603050405020304" pitchFamily="18" charset="0"/>
             </a:endParaRPr>
           </a:p>
         </p:txBody>
@@ -3751,6 +3781,8 @@
                 <a:solidFill>
                   <a:srgbClr val="0000FF"/>
                 </a:solidFill>
+                <a:latin typeface="Times New Roman" panose="02020603050405020304" pitchFamily="18" charset="0"/>
+                <a:cs typeface="Times New Roman" panose="02020603050405020304" pitchFamily="18" charset="0"/>
               </a:rPr>
               <a:t>|CLMO</a:t>
             </a:r>
@@ -3759,6 +3791,8 @@
                 <a:solidFill>
                   <a:srgbClr val="0000FF"/>
                 </a:solidFill>
+                <a:latin typeface="Times New Roman" panose="02020603050405020304" pitchFamily="18" charset="0"/>
+                <a:cs typeface="Times New Roman" panose="02020603050405020304" pitchFamily="18" charset="0"/>
               </a:rPr>
               <a:t>1</a:t>
             </a:r>
@@ -3767,6 +3801,8 @@
                 <a:solidFill>
                   <a:srgbClr val="0000FF"/>
                 </a:solidFill>
+                <a:latin typeface="Times New Roman" panose="02020603050405020304" pitchFamily="18" charset="0"/>
+                <a:cs typeface="Times New Roman" panose="02020603050405020304" pitchFamily="18" charset="0"/>
               </a:rPr>
               <a:t>⟩</a:t>
             </a:r>
@@ -3774,6 +3810,8 @@
               <a:solidFill>
                 <a:srgbClr val="0000FF"/>
               </a:solidFill>
+              <a:latin typeface="Times New Roman" panose="02020603050405020304" pitchFamily="18" charset="0"/>
+              <a:cs typeface="Times New Roman" panose="02020603050405020304" pitchFamily="18" charset="0"/>
             </a:endParaRPr>
           </a:p>
           <a:p>
@@ -3787,6 +3825,8 @@
                 <a:solidFill>
                   <a:srgbClr val="0000FF"/>
                 </a:solidFill>
+                <a:latin typeface="Times New Roman" panose="02020603050405020304" pitchFamily="18" charset="0"/>
+                <a:cs typeface="Times New Roman" panose="02020603050405020304" pitchFamily="18" charset="0"/>
               </a:rPr>
               <a:t>constrained </a:t>
             </a:r>
@@ -3802,6 +3842,8 @@
                 <a:solidFill>
                   <a:srgbClr val="0000FF"/>
                 </a:solidFill>
+                <a:latin typeface="Times New Roman" panose="02020603050405020304" pitchFamily="18" charset="0"/>
+                <a:cs typeface="Times New Roman" panose="02020603050405020304" pitchFamily="18" charset="0"/>
               </a:rPr>
               <a:t>to 1-2 plane</a:t>
             </a:r>
@@ -3809,6 +3851,8 @@
               <a:solidFill>
                 <a:srgbClr val="0000FF"/>
               </a:solidFill>
+              <a:latin typeface="Times New Roman" panose="02020603050405020304" pitchFamily="18" charset="0"/>
+              <a:cs typeface="Times New Roman" panose="02020603050405020304" pitchFamily="18" charset="0"/>
             </a:endParaRPr>
           </a:p>
         </p:txBody>
@@ -3942,6 +3986,8 @@
                 <a:solidFill>
                   <a:srgbClr val="C00000"/>
                 </a:solidFill>
+                <a:latin typeface="Times New Roman" panose="02020603050405020304" pitchFamily="18" charset="0"/>
+                <a:cs typeface="Times New Roman" panose="02020603050405020304" pitchFamily="18" charset="0"/>
               </a:rPr>
               <a:t>|CLMO</a:t>
             </a:r>
@@ -3950,6 +3996,8 @@
                 <a:solidFill>
                   <a:srgbClr val="C00000"/>
                 </a:solidFill>
+                <a:latin typeface="Times New Roman" panose="02020603050405020304" pitchFamily="18" charset="0"/>
+                <a:cs typeface="Times New Roman" panose="02020603050405020304" pitchFamily="18" charset="0"/>
               </a:rPr>
               <a:t>2</a:t>
             </a:r>
@@ -3958,6 +4006,8 @@
                 <a:solidFill>
                   <a:srgbClr val="C00000"/>
                 </a:solidFill>
+                <a:latin typeface="Times New Roman" panose="02020603050405020304" pitchFamily="18" charset="0"/>
+                <a:cs typeface="Times New Roman" panose="02020603050405020304" pitchFamily="18" charset="0"/>
               </a:rPr>
               <a:t>⟩</a:t>
             </a:r>
@@ -3965,6 +4015,8 @@
               <a:solidFill>
                 <a:srgbClr val="C00000"/>
               </a:solidFill>
+              <a:latin typeface="Times New Roman" panose="02020603050405020304" pitchFamily="18" charset="0"/>
+              <a:cs typeface="Times New Roman" panose="02020603050405020304" pitchFamily="18" charset="0"/>
             </a:endParaRPr>
           </a:p>
           <a:p>
@@ -3978,6 +4030,8 @@
                 <a:solidFill>
                   <a:srgbClr val="C00000"/>
                 </a:solidFill>
+                <a:latin typeface="Times New Roman" panose="02020603050405020304" pitchFamily="18" charset="0"/>
+                <a:cs typeface="Times New Roman" panose="02020603050405020304" pitchFamily="18" charset="0"/>
               </a:rPr>
               <a:t>constrained </a:t>
             </a:r>
@@ -3993,6 +4047,8 @@
                 <a:solidFill>
                   <a:srgbClr val="C00000"/>
                 </a:solidFill>
+                <a:latin typeface="Times New Roman" panose="02020603050405020304" pitchFamily="18" charset="0"/>
+                <a:cs typeface="Times New Roman" panose="02020603050405020304" pitchFamily="18" charset="0"/>
               </a:rPr>
               <a:t>to 2-3 plane</a:t>
             </a:r>
@@ -4000,6 +4056,8 @@
               <a:solidFill>
                 <a:srgbClr val="C00000"/>
               </a:solidFill>
+              <a:latin typeface="Times New Roman" panose="02020603050405020304" pitchFamily="18" charset="0"/>
+              <a:cs typeface="Times New Roman" panose="02020603050405020304" pitchFamily="18" charset="0"/>
             </a:endParaRPr>
           </a:p>
         </p:txBody>
@@ -4016,7 +4074,7 @@
         <p:spPr>
           <a:xfrm flipV="1">
             <a:off x="7847354" y="591997"/>
-            <a:ext cx="0" cy="3699028"/>
+            <a:ext cx="2" cy="3699028"/>
           </a:xfrm>
           <a:prstGeom prst="straightConnector1">
             <a:avLst/>
@@ -4177,7 +4235,10 @@
           <a:lstStyle/>
           <a:p>
             <a:pPr algn="ctr"/>
-            <a:endParaRPr lang="en-US"/>
+            <a:endParaRPr lang="en-US">
+              <a:latin typeface="Times New Roman" panose="02020603050405020304" pitchFamily="18" charset="0"/>
+              <a:cs typeface="Times New Roman" panose="02020603050405020304" pitchFamily="18" charset="0"/>
+            </a:endParaRPr>
           </a:p>
         </p:txBody>
       </p:sp>
@@ -4191,8 +4252,8 @@
         </p:nvSpPr>
         <p:spPr>
           <a:xfrm>
-            <a:off x="7313395" y="115713"/>
-            <a:ext cx="1067921" cy="476284"/>
+            <a:off x="7295442" y="115713"/>
+            <a:ext cx="1103828" cy="476284"/>
           </a:xfrm>
           <a:prstGeom prst="rect">
             <a:avLst/>
@@ -4232,6 +4293,8 @@
                     <a:lumMod val="50000"/>
                   </a:schemeClr>
                 </a:solidFill>
+                <a:latin typeface="Times New Roman" panose="02020603050405020304" pitchFamily="18" charset="0"/>
+                <a:cs typeface="Times New Roman" panose="02020603050405020304" pitchFamily="18" charset="0"/>
               </a:rPr>
               <a:t>Energy</a:t>
             </a:r>
@@ -4241,6 +4304,8 @@
                   <a:lumMod val="50000"/>
                 </a:schemeClr>
               </a:solidFill>
+              <a:latin typeface="Times New Roman" panose="02020603050405020304" pitchFamily="18" charset="0"/>
+              <a:cs typeface="Times New Roman" panose="02020603050405020304" pitchFamily="18" charset="0"/>
             </a:endParaRPr>
           </a:p>
         </p:txBody>
@@ -4255,8 +4320,8 @@
         </p:nvSpPr>
         <p:spPr>
           <a:xfrm>
-            <a:off x="12932198" y="4010606"/>
-            <a:ext cx="373821" cy="476284"/>
+            <a:off x="12942618" y="4010606"/>
+            <a:ext cx="352981" cy="476284"/>
           </a:xfrm>
           <a:prstGeom prst="rect">
             <a:avLst/>
@@ -4296,6 +4361,8 @@
                     <a:lumMod val="50000"/>
                   </a:schemeClr>
                 </a:solidFill>
+                <a:latin typeface="Times New Roman" panose="02020603050405020304" pitchFamily="18" charset="0"/>
+                <a:cs typeface="Times New Roman" panose="02020603050405020304" pitchFamily="18" charset="0"/>
               </a:rPr>
               <a:t>α</a:t>
             </a:r>
@@ -4351,6 +4418,8 @@
                 <a:solidFill>
                   <a:srgbClr val="0000FF"/>
                 </a:solidFill>
+                <a:latin typeface="Times New Roman" panose="02020603050405020304" pitchFamily="18" charset="0"/>
+                <a:cs typeface="Times New Roman" panose="02020603050405020304" pitchFamily="18" charset="0"/>
               </a:rPr>
               <a:t>α</a:t>
             </a:r>
@@ -4451,7 +4520,10 @@
           <a:lstStyle/>
           <a:p>
             <a:pPr algn="ctr"/>
-            <a:endParaRPr lang="en-US"/>
+            <a:endParaRPr lang="en-US">
+              <a:latin typeface="Times New Roman" panose="02020603050405020304" pitchFamily="18" charset="0"/>
+              <a:cs typeface="Times New Roman" panose="02020603050405020304" pitchFamily="18" charset="0"/>
+            </a:endParaRPr>
           </a:p>
         </p:txBody>
       </p:sp>
@@ -4549,7 +4621,10 @@
           <a:lstStyle/>
           <a:p>
             <a:pPr algn="ctr"/>
-            <a:endParaRPr lang="en-US"/>
+            <a:endParaRPr lang="en-US">
+              <a:latin typeface="Times New Roman" panose="02020603050405020304" pitchFamily="18" charset="0"/>
+              <a:cs typeface="Times New Roman" panose="02020603050405020304" pitchFamily="18" charset="0"/>
+            </a:endParaRPr>
           </a:p>
         </p:txBody>
       </p:sp>
@@ -4694,7 +4769,10 @@
           <a:lstStyle/>
           <a:p>
             <a:pPr algn="ctr"/>
-            <a:endParaRPr lang="en-US"/>
+            <a:endParaRPr lang="en-US">
+              <a:latin typeface="Times New Roman" panose="02020603050405020304" pitchFamily="18" charset="0"/>
+              <a:cs typeface="Times New Roman" panose="02020603050405020304" pitchFamily="18" charset="0"/>
+            </a:endParaRPr>
           </a:p>
         </p:txBody>
       </p:sp>
@@ -4714,8 +4792,8 @@
         </p:nvSpPr>
         <p:spPr>
           <a:xfrm>
-            <a:off x="5187302" y="3283657"/>
-            <a:ext cx="1220270" cy="476284"/>
+            <a:off x="5229012" y="3283657"/>
+            <a:ext cx="1136850" cy="476284"/>
           </a:xfrm>
           <a:prstGeom prst="rect">
             <a:avLst/>
@@ -4749,10 +4827,12 @@
           <a:p>
             <a:pPr algn="ctr"/>
             <a:r>
-              <a:rPr lang="en-US" b="1" dirty="0">
+              <a:rPr lang="en-US" dirty="0">
                 <a:solidFill>
                   <a:schemeClr val="tx1"/>
                 </a:solidFill>
+                <a:latin typeface="Times New Roman" panose="02020603050405020304" pitchFamily="18" charset="0"/>
+                <a:cs typeface="Times New Roman" panose="02020603050405020304" pitchFamily="18" charset="0"/>
               </a:rPr>
               <a:t>Case A</a:t>
             </a:r>
@@ -4760,6 +4840,8 @@
               <a:solidFill>
                 <a:schemeClr val="tx1"/>
               </a:solidFill>
+              <a:latin typeface="Times New Roman" panose="02020603050405020304" pitchFamily="18" charset="0"/>
+              <a:cs typeface="Times New Roman" panose="02020603050405020304" pitchFamily="18" charset="0"/>
             </a:endParaRPr>
           </a:p>
         </p:txBody>
@@ -4780,8 +4862,8 @@
         </p:nvSpPr>
         <p:spPr>
           <a:xfrm>
-            <a:off x="3571018" y="701344"/>
-            <a:ext cx="1225015" cy="476284"/>
+            <a:off x="3615100" y="701344"/>
+            <a:ext cx="1136850" cy="476284"/>
           </a:xfrm>
           <a:prstGeom prst="rect">
             <a:avLst/>
@@ -4815,10 +4897,12 @@
           <a:p>
             <a:pPr algn="ctr"/>
             <a:r>
-              <a:rPr lang="en-US" b="1" dirty="0">
+              <a:rPr lang="en-US" dirty="0">
                 <a:solidFill>
                   <a:schemeClr val="tx1"/>
                 </a:solidFill>
+                <a:latin typeface="Times New Roman" panose="02020603050405020304" pitchFamily="18" charset="0"/>
+                <a:cs typeface="Times New Roman" panose="02020603050405020304" pitchFamily="18" charset="0"/>
               </a:rPr>
               <a:t>Case B</a:t>
             </a:r>
@@ -4826,6 +4910,8 @@
               <a:solidFill>
                 <a:schemeClr val="tx1"/>
               </a:solidFill>
+              <a:latin typeface="Times New Roman" panose="02020603050405020304" pitchFamily="18" charset="0"/>
+              <a:cs typeface="Times New Roman" panose="02020603050405020304" pitchFamily="18" charset="0"/>
             </a:endParaRPr>
           </a:p>
         </p:txBody>
@@ -4846,8 +4932,8 @@
         </p:nvSpPr>
         <p:spPr>
           <a:xfrm>
-            <a:off x="5104094" y="2905044"/>
-            <a:ext cx="1249061" cy="476284"/>
+            <a:off x="5177832" y="2905044"/>
+            <a:ext cx="1101584" cy="476284"/>
           </a:xfrm>
           <a:prstGeom prst="rect">
             <a:avLst/>
@@ -4881,10 +4967,12 @@
           <a:p>
             <a:pPr algn="ctr"/>
             <a:r>
-              <a:rPr lang="en-US" b="1" dirty="0">
+              <a:rPr lang="en-US" dirty="0">
                 <a:solidFill>
                   <a:schemeClr val="tx1"/>
                 </a:solidFill>
+                <a:latin typeface="Times New Roman" panose="02020603050405020304" pitchFamily="18" charset="0"/>
+                <a:cs typeface="Times New Roman" panose="02020603050405020304" pitchFamily="18" charset="0"/>
               </a:rPr>
               <a:t>Case C</a:t>
             </a:r>
@@ -4892,6 +4980,8 @@
               <a:solidFill>
                 <a:schemeClr val="tx1"/>
               </a:solidFill>
+              <a:latin typeface="Times New Roman" panose="02020603050405020304" pitchFamily="18" charset="0"/>
+              <a:cs typeface="Times New Roman" panose="02020603050405020304" pitchFamily="18" charset="0"/>
             </a:endParaRPr>
           </a:p>
         </p:txBody>
@@ -4913,7 +5003,7 @@
         <p:spPr>
           <a:xfrm>
             <a:off x="10409550" y="848182"/>
-            <a:ext cx="2593980" cy="707886"/>
+            <a:ext cx="2281394" cy="707886"/>
           </a:xfrm>
           <a:prstGeom prst="rect">
             <a:avLst/>
@@ -4951,25 +5041,31 @@
               </a:lnSpc>
             </a:pPr>
             <a:r>
-              <a:rPr lang="en-US" b="1" dirty="0">
+              <a:rPr lang="en-US" dirty="0">
                 <a:solidFill>
                   <a:schemeClr val="tx1"/>
                 </a:solidFill>
+                <a:latin typeface="Times New Roman" panose="02020603050405020304" pitchFamily="18" charset="0"/>
+                <a:cs typeface="Times New Roman" panose="02020603050405020304" pitchFamily="18" charset="0"/>
               </a:rPr>
               <a:t>Case B: </a:t>
             </a:r>
             <a:br>
-              <a:rPr lang="en-US" b="1" dirty="0">
+              <a:rPr lang="en-US" dirty="0">
                 <a:solidFill>
                   <a:schemeClr val="tx1"/>
                 </a:solidFill>
+                <a:latin typeface="Times New Roman" panose="02020603050405020304" pitchFamily="18" charset="0"/>
+                <a:cs typeface="Times New Roman" panose="02020603050405020304" pitchFamily="18" charset="0"/>
               </a:rPr>
             </a:br>
             <a:r>
-              <a:rPr lang="en-US" b="1" dirty="0">
+              <a:rPr lang="en-US" dirty="0">
                 <a:solidFill>
                   <a:schemeClr val="tx1"/>
                 </a:solidFill>
+                <a:latin typeface="Times New Roman" panose="02020603050405020304" pitchFamily="18" charset="0"/>
+                <a:cs typeface="Times New Roman" panose="02020603050405020304" pitchFamily="18" charset="0"/>
               </a:rPr>
               <a:t>occupied-virtual</a:t>
             </a:r>
@@ -4977,6 +5073,8 @@
               <a:solidFill>
                 <a:schemeClr val="tx1"/>
               </a:solidFill>
+              <a:latin typeface="Times New Roman" panose="02020603050405020304" pitchFamily="18" charset="0"/>
+              <a:cs typeface="Times New Roman" panose="02020603050405020304" pitchFamily="18" charset="0"/>
             </a:endParaRPr>
           </a:p>
         </p:txBody>
@@ -4998,7 +5096,7 @@
         <p:spPr>
           <a:xfrm>
             <a:off x="10409552" y="3358808"/>
-            <a:ext cx="2954655" cy="707886"/>
+            <a:ext cx="2605200" cy="707886"/>
           </a:xfrm>
           <a:prstGeom prst="rect">
             <a:avLst/>
@@ -5036,33 +5134,41 @@
               </a:lnSpc>
             </a:pPr>
             <a:r>
-              <a:rPr lang="en-US" b="1" dirty="0">
+              <a:rPr lang="en-US" dirty="0">
                 <a:solidFill>
                   <a:schemeClr val="tx1"/>
                 </a:solidFill>
+                <a:latin typeface="Times New Roman" panose="02020603050405020304" pitchFamily="18" charset="0"/>
+                <a:cs typeface="Times New Roman" panose="02020603050405020304" pitchFamily="18" charset="0"/>
               </a:rPr>
               <a:t>Case A </a:t>
             </a:r>
             <a:r>
-              <a:rPr lang="en-US" b="1">
+              <a:rPr lang="en-US">
                 <a:solidFill>
                   <a:schemeClr val="tx1"/>
                 </a:solidFill>
+                <a:latin typeface="Times New Roman" panose="02020603050405020304" pitchFamily="18" charset="0"/>
+                <a:cs typeface="Times New Roman" panose="02020603050405020304" pitchFamily="18" charset="0"/>
               </a:rPr>
               <a:t>(flat): </a:t>
             </a:r>
             <a:br>
-              <a:rPr lang="en-US" b="1" dirty="0">
+              <a:rPr lang="en-US" dirty="0">
                 <a:solidFill>
                   <a:schemeClr val="tx1"/>
                 </a:solidFill>
+                <a:latin typeface="Times New Roman" panose="02020603050405020304" pitchFamily="18" charset="0"/>
+                <a:cs typeface="Times New Roman" panose="02020603050405020304" pitchFamily="18" charset="0"/>
               </a:rPr>
             </a:br>
             <a:r>
-              <a:rPr lang="en-US" b="1" dirty="0">
+              <a:rPr lang="en-US" dirty="0">
                 <a:solidFill>
                   <a:schemeClr val="tx1"/>
                 </a:solidFill>
+                <a:latin typeface="Times New Roman" panose="02020603050405020304" pitchFamily="18" charset="0"/>
+                <a:cs typeface="Times New Roman" panose="02020603050405020304" pitchFamily="18" charset="0"/>
               </a:rPr>
               <a:t>occupied-occupied</a:t>
             </a:r>
@@ -5070,6 +5176,8 @@
               <a:solidFill>
                 <a:schemeClr val="tx1"/>
               </a:solidFill>
+              <a:latin typeface="Times New Roman" panose="02020603050405020304" pitchFamily="18" charset="0"/>
+              <a:cs typeface="Times New Roman" panose="02020603050405020304" pitchFamily="18" charset="0"/>
             </a:endParaRPr>
           </a:p>
         </p:txBody>
@@ -5091,7 +5199,7 @@
         <p:spPr>
           <a:xfrm>
             <a:off x="10409552" y="2600577"/>
-            <a:ext cx="2561920" cy="707886"/>
+            <a:ext cx="2282997" cy="707886"/>
           </a:xfrm>
           <a:prstGeom prst="rect">
             <a:avLst/>
@@ -5129,25 +5237,31 @@
               </a:lnSpc>
             </a:pPr>
             <a:r>
-              <a:rPr lang="en-US" b="1" dirty="0">
+              <a:rPr lang="en-US" dirty="0">
                 <a:solidFill>
                   <a:schemeClr val="tx1"/>
                 </a:solidFill>
+                <a:latin typeface="Times New Roman" panose="02020603050405020304" pitchFamily="18" charset="0"/>
+                <a:cs typeface="Times New Roman" panose="02020603050405020304" pitchFamily="18" charset="0"/>
               </a:rPr>
               <a:t>Case C: </a:t>
             </a:r>
             <a:br>
-              <a:rPr lang="en-US" b="1" dirty="0">
+              <a:rPr lang="en-US" dirty="0">
                 <a:solidFill>
                   <a:schemeClr val="tx1"/>
                 </a:solidFill>
+                <a:latin typeface="Times New Roman" panose="02020603050405020304" pitchFamily="18" charset="0"/>
+                <a:cs typeface="Times New Roman" panose="02020603050405020304" pitchFamily="18" charset="0"/>
               </a:rPr>
             </a:br>
             <a:r>
-              <a:rPr lang="en-US" b="1" dirty="0">
+              <a:rPr lang="en-US" dirty="0">
                 <a:solidFill>
                   <a:schemeClr val="tx1"/>
                 </a:solidFill>
+                <a:latin typeface="Times New Roman" panose="02020603050405020304" pitchFamily="18" charset="0"/>
+                <a:cs typeface="Times New Roman" panose="02020603050405020304" pitchFamily="18" charset="0"/>
               </a:rPr>
               <a:t>occupied-hybrid</a:t>
             </a:r>
@@ -5155,6 +5269,8 @@
               <a:solidFill>
                 <a:schemeClr val="tx1"/>
               </a:solidFill>
+              <a:latin typeface="Times New Roman" panose="02020603050405020304" pitchFamily="18" charset="0"/>
+              <a:cs typeface="Times New Roman" panose="02020603050405020304" pitchFamily="18" charset="0"/>
             </a:endParaRPr>
           </a:p>
         </p:txBody>

</xml_diff>